<commit_message>
add hc hp hr as features
</commit_message>
<xml_diff>
--- a/Results.pptx
+++ b/Results.pptx
@@ -5,7 +5,7 @@
     <p:sldMasterId id="2147483648" r:id="rId1"/>
   </p:sldMasterIdLst>
   <p:notesMasterIdLst>
-    <p:notesMasterId r:id="rId9"/>
+    <p:notesMasterId r:id="rId10"/>
   </p:notesMasterIdLst>
   <p:sldIdLst>
     <p:sldId id="261" r:id="rId2"/>
@@ -15,6 +15,7 @@
     <p:sldId id="265" r:id="rId6"/>
     <p:sldId id="266" r:id="rId7"/>
     <p:sldId id="268" r:id="rId8"/>
+    <p:sldId id="269" r:id="rId9"/>
   </p:sldIdLst>
   <p:sldSz cx="12192000" cy="6858000"/>
   <p:notesSz cx="6858000" cy="9144000"/>
@@ -203,7 +204,7 @@
           <a:p>
             <a:fld id="{00AF4C90-A0CB-45B0-8210-59338C5C7B2C}" type="datetimeFigureOut">
               <a:rPr lang="zh-TW" altLang="en-US" smtClean="0"/>
-              <a:t>2022/1/12</a:t>
+              <a:t>2022/1/16</a:t>
             </a:fld>
             <a:endParaRPr lang="zh-TW" altLang="en-US"/>
           </a:p>
@@ -785,7 +786,7 @@
           <a:p>
             <a:fld id="{A3AB22E8-4A63-455D-9C85-5BFA64C3707A}" type="datetimeFigureOut">
               <a:rPr lang="zh-TW" altLang="en-US" smtClean="0"/>
-              <a:t>2022/1/12</a:t>
+              <a:t>2022/1/16</a:t>
             </a:fld>
             <a:endParaRPr lang="zh-TW" altLang="en-US"/>
           </a:p>
@@ -983,7 +984,7 @@
           <a:p>
             <a:fld id="{A3AB22E8-4A63-455D-9C85-5BFA64C3707A}" type="datetimeFigureOut">
               <a:rPr lang="zh-TW" altLang="en-US" smtClean="0"/>
-              <a:t>2022/1/12</a:t>
+              <a:t>2022/1/16</a:t>
             </a:fld>
             <a:endParaRPr lang="zh-TW" altLang="en-US"/>
           </a:p>
@@ -1191,7 +1192,7 @@
           <a:p>
             <a:fld id="{A3AB22E8-4A63-455D-9C85-5BFA64C3707A}" type="datetimeFigureOut">
               <a:rPr lang="zh-TW" altLang="en-US" smtClean="0"/>
-              <a:t>2022/1/12</a:t>
+              <a:t>2022/1/16</a:t>
             </a:fld>
             <a:endParaRPr lang="zh-TW" altLang="en-US"/>
           </a:p>
@@ -1389,7 +1390,7 @@
           <a:p>
             <a:fld id="{A3AB22E8-4A63-455D-9C85-5BFA64C3707A}" type="datetimeFigureOut">
               <a:rPr lang="zh-TW" altLang="en-US" smtClean="0"/>
-              <a:t>2022/1/12</a:t>
+              <a:t>2022/1/16</a:t>
             </a:fld>
             <a:endParaRPr lang="zh-TW" altLang="en-US"/>
           </a:p>
@@ -1664,7 +1665,7 @@
           <a:p>
             <a:fld id="{A3AB22E8-4A63-455D-9C85-5BFA64C3707A}" type="datetimeFigureOut">
               <a:rPr lang="zh-TW" altLang="en-US" smtClean="0"/>
-              <a:t>2022/1/12</a:t>
+              <a:t>2022/1/16</a:t>
             </a:fld>
             <a:endParaRPr lang="zh-TW" altLang="en-US"/>
           </a:p>
@@ -1929,7 +1930,7 @@
           <a:p>
             <a:fld id="{A3AB22E8-4A63-455D-9C85-5BFA64C3707A}" type="datetimeFigureOut">
               <a:rPr lang="zh-TW" altLang="en-US" smtClean="0"/>
-              <a:t>2022/1/12</a:t>
+              <a:t>2022/1/16</a:t>
             </a:fld>
             <a:endParaRPr lang="zh-TW" altLang="en-US"/>
           </a:p>
@@ -2341,7 +2342,7 @@
           <a:p>
             <a:fld id="{A3AB22E8-4A63-455D-9C85-5BFA64C3707A}" type="datetimeFigureOut">
               <a:rPr lang="zh-TW" altLang="en-US" smtClean="0"/>
-              <a:t>2022/1/12</a:t>
+              <a:t>2022/1/16</a:t>
             </a:fld>
             <a:endParaRPr lang="zh-TW" altLang="en-US"/>
           </a:p>
@@ -2482,7 +2483,7 @@
           <a:p>
             <a:fld id="{A3AB22E8-4A63-455D-9C85-5BFA64C3707A}" type="datetimeFigureOut">
               <a:rPr lang="zh-TW" altLang="en-US" smtClean="0"/>
-              <a:t>2022/1/12</a:t>
+              <a:t>2022/1/16</a:t>
             </a:fld>
             <a:endParaRPr lang="zh-TW" altLang="en-US"/>
           </a:p>
@@ -2595,7 +2596,7 @@
           <a:p>
             <a:fld id="{A3AB22E8-4A63-455D-9C85-5BFA64C3707A}" type="datetimeFigureOut">
               <a:rPr lang="zh-TW" altLang="en-US" smtClean="0"/>
-              <a:t>2022/1/12</a:t>
+              <a:t>2022/1/16</a:t>
             </a:fld>
             <a:endParaRPr lang="zh-TW" altLang="en-US"/>
           </a:p>
@@ -2906,7 +2907,7 @@
           <a:p>
             <a:fld id="{A3AB22E8-4A63-455D-9C85-5BFA64C3707A}" type="datetimeFigureOut">
               <a:rPr lang="zh-TW" altLang="en-US" smtClean="0"/>
-              <a:t>2022/1/12</a:t>
+              <a:t>2022/1/16</a:t>
             </a:fld>
             <a:endParaRPr lang="zh-TW" altLang="en-US"/>
           </a:p>
@@ -3194,7 +3195,7 @@
           <a:p>
             <a:fld id="{A3AB22E8-4A63-455D-9C85-5BFA64C3707A}" type="datetimeFigureOut">
               <a:rPr lang="zh-TW" altLang="en-US" smtClean="0"/>
-              <a:t>2022/1/12</a:t>
+              <a:t>2022/1/16</a:t>
             </a:fld>
             <a:endParaRPr lang="zh-TW" altLang="en-US"/>
           </a:p>
@@ -3435,7 +3436,7 @@
           <a:p>
             <a:fld id="{A3AB22E8-4A63-455D-9C85-5BFA64C3707A}" type="datetimeFigureOut">
               <a:rPr lang="zh-TW" altLang="en-US" smtClean="0"/>
-              <a:t>2022/1/12</a:t>
+              <a:t>2022/1/16</a:t>
             </a:fld>
             <a:endParaRPr lang="zh-TW" altLang="en-US"/>
           </a:p>
@@ -12932,6 +12933,633 @@
 </p:sld>
 </file>
 
+<file path=ppt/slides/slide8.xml><?xml version="1.0" encoding="utf-8"?>
+<p:sld xmlns:a="http://schemas.openxmlformats.org/drawingml/2006/main" xmlns:r="http://schemas.openxmlformats.org/officeDocument/2006/relationships" xmlns:p="http://schemas.openxmlformats.org/presentationml/2006/main">
+  <p:cSld>
+    <p:spTree>
+      <p:nvGrpSpPr>
+        <p:cNvPr id="1" name=""/>
+        <p:cNvGrpSpPr/>
+        <p:nvPr/>
+      </p:nvGrpSpPr>
+      <p:grpSpPr>
+        <a:xfrm>
+          <a:off x="0" y="0"/>
+          <a:ext cx="0" cy="0"/>
+          <a:chOff x="0" y="0"/>
+          <a:chExt cx="0" cy="0"/>
+        </a:xfrm>
+      </p:grpSpPr>
+      <p:sp>
+        <p:nvSpPr>
+          <p:cNvPr id="2" name="標題 1">
+            <a:extLst>
+              <a:ext uri="{FF2B5EF4-FFF2-40B4-BE49-F238E27FC236}">
+                <a16:creationId xmlns:a16="http://schemas.microsoft.com/office/drawing/2014/main" id="{592FC2E3-2219-4FC6-8C09-39F7BE975570}"/>
+              </a:ext>
+            </a:extLst>
+          </p:cNvPr>
+          <p:cNvSpPr>
+            <a:spLocks noGrp="1"/>
+          </p:cNvSpPr>
+          <p:nvPr>
+            <p:ph type="title"/>
+          </p:nvPr>
+        </p:nvSpPr>
+        <p:spPr/>
+        <p:txBody>
+          <a:bodyPr/>
+          <a:lstStyle/>
+          <a:p>
+            <a:r>
+              <a:rPr lang="en-US" altLang="zh-TW" dirty="0"/>
+              <a:t>Other Feature</a:t>
+            </a:r>
+            <a:endParaRPr lang="zh-TW" altLang="en-US" dirty="0"/>
+          </a:p>
+        </p:txBody>
+      </p:sp>
+      <p:graphicFrame>
+        <p:nvGraphicFramePr>
+          <p:cNvPr id="4" name="內容版面配置區 3">
+            <a:extLst>
+              <a:ext uri="{FF2B5EF4-FFF2-40B4-BE49-F238E27FC236}">
+                <a16:creationId xmlns:a16="http://schemas.microsoft.com/office/drawing/2014/main" id="{DBB0724E-754F-4072-8091-DEC41EE0ADA6}"/>
+              </a:ext>
+            </a:extLst>
+          </p:cNvPr>
+          <p:cNvGraphicFramePr>
+            <a:graphicFrameLocks noGrp="1"/>
+          </p:cNvGraphicFramePr>
+          <p:nvPr>
+            <p:ph idx="1"/>
+            <p:extLst>
+              <p:ext uri="{D42A27DB-BD31-4B8C-83A1-F6EECF244321}">
+                <p14:modId xmlns:p14="http://schemas.microsoft.com/office/powerpoint/2010/main" val="4087919969"/>
+              </p:ext>
+            </p:extLst>
+          </p:nvPr>
+        </p:nvGraphicFramePr>
+        <p:xfrm>
+          <a:off x="838200" y="3182476"/>
+          <a:ext cx="10515600" cy="1935480"/>
+        </p:xfrm>
+        <a:graphic>
+          <a:graphicData uri="http://schemas.openxmlformats.org/drawingml/2006/table">
+            <a:tbl>
+              <a:tblPr firstRow="1" bandRow="1">
+                <a:tableStyleId>{5C22544A-7EE6-4342-B048-85BDC9FD1C3A}</a:tableStyleId>
+              </a:tblPr>
+              <a:tblGrid>
+                <a:gridCol w="3505200">
+                  <a:extLst>
+                    <a:ext uri="{9D8B030D-6E8A-4147-A177-3AD203B41FA5}">
+                      <a16:colId xmlns:a16="http://schemas.microsoft.com/office/drawing/2014/main" val="2997454730"/>
+                    </a:ext>
+                  </a:extLst>
+                </a:gridCol>
+                <a:gridCol w="3505200">
+                  <a:extLst>
+                    <a:ext uri="{9D8B030D-6E8A-4147-A177-3AD203B41FA5}">
+                      <a16:colId xmlns:a16="http://schemas.microsoft.com/office/drawing/2014/main" val="195428819"/>
+                    </a:ext>
+                  </a:extLst>
+                </a:gridCol>
+                <a:gridCol w="3505200">
+                  <a:extLst>
+                    <a:ext uri="{9D8B030D-6E8A-4147-A177-3AD203B41FA5}">
+                      <a16:colId xmlns:a16="http://schemas.microsoft.com/office/drawing/2014/main" val="3155561913"/>
+                    </a:ext>
+                  </a:extLst>
+                </a:gridCol>
+              </a:tblGrid>
+              <a:tr h="370840">
+                <a:tc>
+                  <a:txBody>
+                    <a:bodyPr/>
+                    <a:lstStyle/>
+                    <a:p>
+                      <a:pPr marL="0" marR="0" lvl="0" indent="0" algn="l" defTabSz="914400" rtl="0" eaLnBrk="1" fontAlgn="auto" latinLnBrk="0" hangingPunct="1">
+                        <a:lnSpc>
+                          <a:spcPct val="100000"/>
+                        </a:lnSpc>
+                        <a:spcBef>
+                          <a:spcPts val="0"/>
+                        </a:spcBef>
+                        <a:spcAft>
+                          <a:spcPts val="0"/>
+                        </a:spcAft>
+                        <a:buClrTx/>
+                        <a:buSzTx/>
+                        <a:buFontTx/>
+                        <a:buNone/>
+                        <a:tabLst/>
+                        <a:defRPr/>
+                      </a:pPr>
+                      <a:r>
+                        <a:rPr lang="en-US" altLang="zh-TW" sz="1600" dirty="0" err="1"/>
+                        <a:t>Dialog_rearrange</a:t>
+                      </a:r>
+                      <a:endParaRPr lang="zh-TW" altLang="en-US" sz="1600" dirty="0"/>
+                    </a:p>
+                    <a:p>
+                      <a:pPr marL="0" marR="0" lvl="0" indent="0" algn="l" defTabSz="914400" rtl="0" eaLnBrk="1" fontAlgn="auto" latinLnBrk="0" hangingPunct="1">
+                        <a:lnSpc>
+                          <a:spcPct val="100000"/>
+                        </a:lnSpc>
+                        <a:spcBef>
+                          <a:spcPts val="0"/>
+                        </a:spcBef>
+                        <a:spcAft>
+                          <a:spcPts val="0"/>
+                        </a:spcAft>
+                        <a:buClrTx/>
+                        <a:buSzTx/>
+                        <a:buFontTx/>
+                        <a:buNone/>
+                        <a:tabLst/>
+                        <a:defRPr/>
+                      </a:pPr>
+                      <a:r>
+                        <a:rPr lang="en-US" altLang="zh-TW" sz="1600" dirty="0"/>
+                        <a:t>Skip the </a:t>
+                      </a:r>
+                      <a:r>
+                        <a:rPr lang="en-US" altLang="zh-TW" sz="1600" dirty="0" err="1"/>
+                        <a:t>utt</a:t>
+                      </a:r>
+                      <a:r>
+                        <a:rPr lang="en-US" altLang="zh-TW" sz="1600" dirty="0"/>
+                        <a:t> which is not in </a:t>
+                      </a:r>
+                    </a:p>
+                    <a:p>
+                      <a:pPr marL="0" marR="0" lvl="0" indent="0" algn="l" defTabSz="914400" rtl="0" eaLnBrk="1" fontAlgn="auto" latinLnBrk="0" hangingPunct="1">
+                        <a:lnSpc>
+                          <a:spcPct val="100000"/>
+                        </a:lnSpc>
+                        <a:spcBef>
+                          <a:spcPts val="0"/>
+                        </a:spcBef>
+                        <a:spcAft>
+                          <a:spcPts val="0"/>
+                        </a:spcAft>
+                        <a:buClrTx/>
+                        <a:buSzTx/>
+                        <a:buFontTx/>
+                        <a:buNone/>
+                        <a:tabLst/>
+                        <a:defRPr/>
+                      </a:pPr>
+                      <a:r>
+                        <a:rPr lang="en-US" altLang="zh-TW" sz="1600" dirty="0"/>
+                        <a:t>{ang, hap, neu, sad}</a:t>
+                      </a:r>
+                      <a:endParaRPr lang="zh-TW" altLang="en-US" sz="1600" dirty="0"/>
+                    </a:p>
+                  </a:txBody>
+                  <a:tcPr/>
+                </a:tc>
+                <a:tc>
+                  <a:txBody>
+                    <a:bodyPr/>
+                    <a:lstStyle/>
+                    <a:p>
+                      <a:r>
+                        <a:rPr lang="en-US" altLang="zh-TW" dirty="0"/>
+                        <a:t>EMO SHIFT (86.01 %)</a:t>
+                      </a:r>
+                    </a:p>
+                    <a:p>
+                      <a:r>
+                        <a:rPr lang="en-US" altLang="zh-TW" dirty="0"/>
+                        <a:t>m</a:t>
+                      </a:r>
+                      <a:r>
+                        <a:rPr lang="en-US" altLang="zh-TW"/>
+                        <a:t>ean </a:t>
+                      </a:r>
+                      <a:r>
+                        <a:rPr lang="en-US" altLang="zh-TW" dirty="0"/>
+                        <a:t>+- std</a:t>
+                      </a:r>
+                      <a:endParaRPr lang="zh-TW" altLang="en-US" dirty="0"/>
+                    </a:p>
+                  </a:txBody>
+                  <a:tcPr/>
+                </a:tc>
+                <a:tc>
+                  <a:txBody>
+                    <a:bodyPr/>
+                    <a:lstStyle/>
+                    <a:p>
+                      <a:r>
+                        <a:rPr lang="en-US" altLang="zh-TW" dirty="0"/>
+                        <a:t>EMO NO SHIFT (13.99 %)</a:t>
+                      </a:r>
+                    </a:p>
+                    <a:p>
+                      <a:pPr marL="0" marR="0" lvl="0" indent="0" algn="l" defTabSz="914400" rtl="0" eaLnBrk="1" fontAlgn="auto" latinLnBrk="0" hangingPunct="1">
+                        <a:lnSpc>
+                          <a:spcPct val="100000"/>
+                        </a:lnSpc>
+                        <a:spcBef>
+                          <a:spcPts val="0"/>
+                        </a:spcBef>
+                        <a:spcAft>
+                          <a:spcPts val="0"/>
+                        </a:spcAft>
+                        <a:buClrTx/>
+                        <a:buSzTx/>
+                        <a:buFontTx/>
+                        <a:buNone/>
+                        <a:tabLst/>
+                        <a:defRPr/>
+                      </a:pPr>
+                      <a:r>
+                        <a:rPr lang="en-US" altLang="zh-TW" dirty="0"/>
+                        <a:t>mean +- std</a:t>
+                      </a:r>
+                      <a:endParaRPr lang="zh-TW" altLang="en-US" dirty="0"/>
+                    </a:p>
+                  </a:txBody>
+                  <a:tcPr/>
+                </a:tc>
+                <a:extLst>
+                  <a:ext uri="{0D108BD9-81ED-4DB2-BD59-A6C34878D82A}">
+                    <a16:rowId xmlns:a16="http://schemas.microsoft.com/office/drawing/2014/main" val="1202098422"/>
+                  </a:ext>
+                </a:extLst>
+              </a:tr>
+              <a:tr h="370840">
+                <a:tc>
+                  <a:txBody>
+                    <a:bodyPr/>
+                    <a:lstStyle/>
+                    <a:p>
+                      <a:r>
+                        <a:rPr lang="en-US" altLang="zh-TW" dirty="0" err="1"/>
+                        <a:t>cosine_similarity</a:t>
+                      </a:r>
+                      <a:r>
+                        <a:rPr lang="en-US" altLang="zh-TW" dirty="0"/>
+                        <a:t> (0~1)</a:t>
+                      </a:r>
+                      <a:endParaRPr lang="zh-TW" altLang="en-US" dirty="0"/>
+                    </a:p>
+                  </a:txBody>
+                  <a:tcPr/>
+                </a:tc>
+                <a:tc>
+                  <a:txBody>
+                    <a:bodyPr/>
+                    <a:lstStyle/>
+                    <a:p>
+                      <a:r>
+                        <a:rPr lang="en-US" altLang="zh-TW" dirty="0"/>
+                        <a:t>0.57+-0.54</a:t>
+                      </a:r>
+                      <a:endParaRPr lang="zh-TW" altLang="en-US" dirty="0"/>
+                    </a:p>
+                  </a:txBody>
+                  <a:tcPr/>
+                </a:tc>
+                <a:tc>
+                  <a:txBody>
+                    <a:bodyPr/>
+                    <a:lstStyle/>
+                    <a:p>
+                      <a:pPr marL="0" marR="0" lvl="0" indent="0" algn="l" defTabSz="914400" rtl="0" eaLnBrk="1" fontAlgn="auto" latinLnBrk="0" hangingPunct="1">
+                        <a:lnSpc>
+                          <a:spcPct val="100000"/>
+                        </a:lnSpc>
+                        <a:spcBef>
+                          <a:spcPts val="0"/>
+                        </a:spcBef>
+                        <a:spcAft>
+                          <a:spcPts val="0"/>
+                        </a:spcAft>
+                        <a:buClrTx/>
+                        <a:buSzTx/>
+                        <a:buFontTx/>
+                        <a:buNone/>
+                        <a:tabLst/>
+                        <a:defRPr/>
+                      </a:pPr>
+                      <a:r>
+                        <a:rPr lang="en-US" altLang="zh-TW" dirty="0"/>
+                        <a:t>0.84+-0.3</a:t>
+                      </a:r>
+                      <a:endParaRPr lang="zh-TW" altLang="en-US" dirty="0"/>
+                    </a:p>
+                  </a:txBody>
+                  <a:tcPr/>
+                </a:tc>
+                <a:extLst>
+                  <a:ext uri="{0D108BD9-81ED-4DB2-BD59-A6C34878D82A}">
+                    <a16:rowId xmlns:a16="http://schemas.microsoft.com/office/drawing/2014/main" val="1070740225"/>
+                  </a:ext>
+                </a:extLst>
+              </a:tr>
+              <a:tr h="370840">
+                <a:tc>
+                  <a:txBody>
+                    <a:bodyPr/>
+                    <a:lstStyle/>
+                    <a:p>
+                      <a:r>
+                        <a:rPr lang="en-US" altLang="zh-TW" dirty="0" err="1"/>
+                        <a:t>kl_divergence</a:t>
+                      </a:r>
+                      <a:r>
+                        <a:rPr lang="en-US" altLang="zh-TW" dirty="0"/>
+                        <a:t> (0~inf)</a:t>
+                      </a:r>
+                      <a:endParaRPr lang="zh-TW" altLang="en-US" dirty="0"/>
+                    </a:p>
+                  </a:txBody>
+                  <a:tcPr/>
+                </a:tc>
+                <a:tc>
+                  <a:txBody>
+                    <a:bodyPr/>
+                    <a:lstStyle/>
+                    <a:p>
+                      <a:r>
+                        <a:rPr lang="en-US" altLang="zh-TW" dirty="0"/>
+                        <a:t>0.98+-1.66</a:t>
+                      </a:r>
+                      <a:endParaRPr lang="zh-TW" altLang="en-US" dirty="0"/>
+                    </a:p>
+                  </a:txBody>
+                  <a:tcPr/>
+                </a:tc>
+                <a:tc>
+                  <a:txBody>
+                    <a:bodyPr/>
+                    <a:lstStyle/>
+                    <a:p>
+                      <a:r>
+                        <a:rPr lang="en-US" altLang="zh-TW" dirty="0"/>
+                        <a:t>0.31+-0.66</a:t>
+                      </a:r>
+                      <a:endParaRPr lang="zh-TW" altLang="en-US" dirty="0"/>
+                    </a:p>
+                  </a:txBody>
+                  <a:tcPr/>
+                </a:tc>
+                <a:extLst>
+                  <a:ext uri="{0D108BD9-81ED-4DB2-BD59-A6C34878D82A}">
+                    <a16:rowId xmlns:a16="http://schemas.microsoft.com/office/drawing/2014/main" val="3110873442"/>
+                  </a:ext>
+                </a:extLst>
+              </a:tr>
+              <a:tr h="370840">
+                <a:tc>
+                  <a:txBody>
+                    <a:bodyPr/>
+                    <a:lstStyle/>
+                    <a:p>
+                      <a:r>
+                        <a:rPr lang="en-US" altLang="zh-TW" dirty="0" err="1"/>
+                        <a:t>earth_mover_dist</a:t>
+                      </a:r>
+                      <a:r>
+                        <a:rPr lang="en-US" altLang="zh-TW" dirty="0"/>
+                        <a:t> (0~inf)</a:t>
+                      </a:r>
+                      <a:endParaRPr lang="zh-TW" altLang="en-US" dirty="0"/>
+                    </a:p>
+                  </a:txBody>
+                  <a:tcPr/>
+                </a:tc>
+                <a:tc>
+                  <a:txBody>
+                    <a:bodyPr/>
+                    <a:lstStyle/>
+                    <a:p>
+                      <a:r>
+                        <a:rPr lang="en-US" altLang="zh-TW" dirty="0"/>
+                        <a:t>0.92+-0.78</a:t>
+                      </a:r>
+                      <a:endParaRPr lang="zh-TW" altLang="en-US" dirty="0"/>
+                    </a:p>
+                  </a:txBody>
+                  <a:tcPr/>
+                </a:tc>
+                <a:tc>
+                  <a:txBody>
+                    <a:bodyPr/>
+                    <a:lstStyle/>
+                    <a:p>
+                      <a:r>
+                        <a:rPr lang="en-US" altLang="zh-TW" dirty="0"/>
+                        <a:t>0.72+-0.57</a:t>
+                      </a:r>
+                      <a:endParaRPr lang="zh-TW" altLang="en-US" dirty="0"/>
+                    </a:p>
+                  </a:txBody>
+                  <a:tcPr/>
+                </a:tc>
+                <a:extLst>
+                  <a:ext uri="{0D108BD9-81ED-4DB2-BD59-A6C34878D82A}">
+                    <a16:rowId xmlns:a16="http://schemas.microsoft.com/office/drawing/2014/main" val="1360057023"/>
+                  </a:ext>
+                </a:extLst>
+              </a:tr>
+            </a:tbl>
+          </a:graphicData>
+        </a:graphic>
+      </p:graphicFrame>
+      <mc:AlternateContent xmlns:mc="http://schemas.openxmlformats.org/markup-compatibility/2006">
+        <mc:Choice xmlns:a14="http://schemas.microsoft.com/office/drawing/2010/main" Requires="a14">
+          <p:sp>
+            <p:nvSpPr>
+              <p:cNvPr id="5" name="文字方塊 4">
+                <a:extLst>
+                  <a:ext uri="{FF2B5EF4-FFF2-40B4-BE49-F238E27FC236}">
+                    <a16:creationId xmlns:a16="http://schemas.microsoft.com/office/drawing/2014/main" id="{E56A76DC-01F4-4EF7-9F8F-C60162984493}"/>
+                  </a:ext>
+                </a:extLst>
+              </p:cNvPr>
+              <p:cNvSpPr txBox="1"/>
+              <p:nvPr/>
+            </p:nvSpPr>
+            <p:spPr>
+              <a:xfrm>
+                <a:off x="838200" y="1690688"/>
+                <a:ext cx="8797413" cy="1316322"/>
+              </a:xfrm>
+              <a:prstGeom prst="rect">
+                <a:avLst/>
+              </a:prstGeom>
+              <a:noFill/>
+            </p:spPr>
+            <p:txBody>
+              <a:bodyPr wrap="square" rtlCol="0">
+                <a:spAutoFit/>
+              </a:bodyPr>
+              <a:lstStyle/>
+              <a:p>
+                <a:pPr marL="285750" indent="-285750">
+                  <a:buFont typeface="Arial" panose="020B0604020202020204" pitchFamily="34" charset="0"/>
+                  <a:buChar char="•"/>
+                </a:pPr>
+                <a:r>
+                  <a:rPr lang="en-US" altLang="zh-TW" sz="2000" dirty="0"/>
+                  <a:t>Calculate the difference between two emo. distributions (</a:t>
+                </a:r>
+                <a14:m>
+                  <m:oMath xmlns:m="http://schemas.openxmlformats.org/officeDocument/2006/math">
+                    <m:sSub>
+                      <m:sSubPr>
+                        <m:ctrlPr>
+                          <a:rPr lang="en-US" altLang="zh-TW" sz="2000" i="1">
+                            <a:latin typeface="Cambria Math" panose="02040503050406030204" pitchFamily="18" charset="0"/>
+                          </a:rPr>
+                        </m:ctrlPr>
+                      </m:sSubPr>
+                      <m:e>
+                        <m:r>
+                          <a:rPr lang="en-US" altLang="zh-TW" sz="2000" i="1">
+                            <a:latin typeface="Cambria Math" panose="02040503050406030204" pitchFamily="18" charset="0"/>
+                          </a:rPr>
+                          <m:t>𝑈</m:t>
+                        </m:r>
+                      </m:e>
+                      <m:sub>
+                        <m:r>
+                          <a:rPr lang="en-US" altLang="zh-TW" sz="2000" i="1">
+                            <a:latin typeface="Cambria Math" panose="02040503050406030204" pitchFamily="18" charset="0"/>
+                          </a:rPr>
+                          <m:t>𝑐</m:t>
+                        </m:r>
+                      </m:sub>
+                    </m:sSub>
+                  </m:oMath>
+                </a14:m>
+                <a:r>
+                  <a:rPr lang="en-US" altLang="zh-TW" sz="2000" dirty="0"/>
+                  <a:t> &amp; </a:t>
+                </a:r>
+                <a14:m>
+                  <m:oMath xmlns:m="http://schemas.openxmlformats.org/officeDocument/2006/math">
+                    <m:sSub>
+                      <m:sSubPr>
+                        <m:ctrlPr>
+                          <a:rPr lang="en-US" altLang="zh-TW" sz="2000" i="1">
+                            <a:latin typeface="Cambria Math" panose="02040503050406030204" pitchFamily="18" charset="0"/>
+                          </a:rPr>
+                        </m:ctrlPr>
+                      </m:sSubPr>
+                      <m:e>
+                        <m:r>
+                          <a:rPr lang="en-US" altLang="zh-TW" sz="2000" i="1">
+                            <a:latin typeface="Cambria Math" panose="02040503050406030204" pitchFamily="18" charset="0"/>
+                          </a:rPr>
+                          <m:t>𝑈</m:t>
+                        </m:r>
+                      </m:e>
+                      <m:sub>
+                        <m:r>
+                          <a:rPr lang="en-US" altLang="zh-TW" sz="2000" i="1">
+                            <a:latin typeface="Cambria Math" panose="02040503050406030204" pitchFamily="18" charset="0"/>
+                          </a:rPr>
+                          <m:t>𝑝</m:t>
+                        </m:r>
+                      </m:sub>
+                    </m:sSub>
+                  </m:oMath>
+                </a14:m>
+                <a:r>
+                  <a:rPr lang="en-US" altLang="zh-TW" sz="2000" dirty="0"/>
+                  <a:t>)</a:t>
+                </a:r>
+              </a:p>
+              <a:p>
+                <a:pPr marL="285750" indent="-285750">
+                  <a:buFont typeface="Arial" panose="020B0604020202020204" pitchFamily="34" charset="0"/>
+                  <a:buChar char="•"/>
+                </a:pPr>
+                <a:r>
+                  <a:rPr lang="en-US" altLang="zh-TW" sz="2000" dirty="0"/>
+                  <a:t>emo distribution from DAG</a:t>
+                </a:r>
+              </a:p>
+              <a:p>
+                <a:pPr marL="742950" lvl="1" indent="-285750">
+                  <a:buFont typeface="Arial" panose="020B0604020202020204" pitchFamily="34" charset="0"/>
+                  <a:buChar char="•"/>
+                </a:pPr>
+                <a:r>
+                  <a:rPr lang="en-US" altLang="zh-TW" sz="2000" dirty="0"/>
+                  <a:t>UAR: 68.64%, ACC:66.62%</a:t>
+                </a:r>
+              </a:p>
+              <a:p>
+                <a:endParaRPr lang="zh-TW" altLang="en-US" dirty="0"/>
+              </a:p>
+            </p:txBody>
+          </p:sp>
+        </mc:Choice>
+        <mc:Fallback>
+          <p:sp>
+            <p:nvSpPr>
+              <p:cNvPr id="5" name="文字方塊 4">
+                <a:extLst>
+                  <a:ext uri="{FF2B5EF4-FFF2-40B4-BE49-F238E27FC236}">
+                    <a16:creationId xmlns:a16="http://schemas.microsoft.com/office/drawing/2014/main" id="{E56A76DC-01F4-4EF7-9F8F-C60162984493}"/>
+                  </a:ext>
+                </a:extLst>
+              </p:cNvPr>
+              <p:cNvSpPr txBox="1">
+                <a:spLocks noRot="1" noChangeAspect="1" noMove="1" noResize="1" noEditPoints="1" noAdjustHandles="1" noChangeArrowheads="1" noChangeShapeType="1" noTextEdit="1"/>
+              </p:cNvSpPr>
+              <p:nvPr/>
+            </p:nvSpPr>
+            <p:spPr>
+              <a:xfrm>
+                <a:off x="838200" y="1690688"/>
+                <a:ext cx="8797413" cy="1316322"/>
+              </a:xfrm>
+              <a:prstGeom prst="rect">
+                <a:avLst/>
+              </a:prstGeom>
+              <a:blipFill>
+                <a:blip r:embed="rId2"/>
+                <a:stretch>
+                  <a:fillRect l="-624" t="-1852"/>
+                </a:stretch>
+              </a:blipFill>
+            </p:spPr>
+            <p:txBody>
+              <a:bodyPr/>
+              <a:lstStyle/>
+              <a:p>
+                <a:r>
+                  <a:rPr lang="zh-TW" altLang="en-US">
+                    <a:noFill/>
+                  </a:rPr>
+                  <a:t> </a:t>
+                </a:r>
+              </a:p>
+            </p:txBody>
+          </p:sp>
+        </mc:Fallback>
+      </mc:AlternateContent>
+    </p:spTree>
+    <p:extLst>
+      <p:ext uri="{BB962C8B-B14F-4D97-AF65-F5344CB8AC3E}">
+        <p14:creationId xmlns:p14="http://schemas.microsoft.com/office/powerpoint/2010/main" val="1926329833"/>
+      </p:ext>
+    </p:extLst>
+  </p:cSld>
+  <p:clrMapOvr>
+    <a:masterClrMapping/>
+  </p:clrMapOvr>
+</p:sld>
+</file>
+
 <file path=ppt/theme/theme1.xml><?xml version="1.0" encoding="utf-8"?>
 <a:theme xmlns:a="http://schemas.openxmlformats.org/drawingml/2006/main" name="Office 佈景主題">
   <a:themeElements>

</xml_diff>